<commit_message>
Big upload, rolled back, back on ex.hhd
</commit_message>
<xml_diff>
--- a/Thesis/matlab_code/PIswelling/PIswelling.pptx
+++ b/Thesis/matlab_code/PIswelling/PIswelling.pptx
@@ -60,7 +60,7 @@
       </p:grpSpPr>
       <p:sp>
         <p:nvSpPr>
-          <p:cNvPr id="26" name="PlaceHolder 1"/>
+          <p:cNvPr id="23" name="PlaceHolder 1"/>
           <p:cNvSpPr>
             <a:spLocks noGrp="1"/>
           </p:cNvSpPr>
@@ -80,13 +80,14 @@
         <p:txBody>
           <a:bodyPr lIns="0" rIns="0" tIns="0" bIns="0" anchor="ctr"/>
           <a:p>
-            <a:endParaRPr/>
-          </a:p>
-        </p:txBody>
-      </p:sp>
-      <p:sp>
-        <p:nvSpPr>
-          <p:cNvPr id="27" name="PlaceHolder 2"/>
+            <a:pPr algn="ctr"/>
+            <a:endParaRPr/>
+          </a:p>
+        </p:txBody>
+      </p:sp>
+      <p:sp>
+        <p:nvSpPr>
+          <p:cNvPr id="24" name="PlaceHolder 2"/>
           <p:cNvSpPr>
             <a:spLocks noGrp="1"/>
           </p:cNvSpPr>
@@ -112,7 +113,7 @@
       </p:sp>
       <p:sp>
         <p:nvSpPr>
-          <p:cNvPr id="28" name="PlaceHolder 3"/>
+          <p:cNvPr id="25" name="PlaceHolder 3"/>
           <p:cNvSpPr>
             <a:spLocks noGrp="1"/>
           </p:cNvSpPr>
@@ -160,7 +161,7 @@
       </p:grpSpPr>
       <p:sp>
         <p:nvSpPr>
-          <p:cNvPr id="29" name="PlaceHolder 1"/>
+          <p:cNvPr id="26" name="PlaceHolder 1"/>
           <p:cNvSpPr>
             <a:spLocks noGrp="1"/>
           </p:cNvSpPr>
@@ -180,13 +181,14 @@
         <p:txBody>
           <a:bodyPr lIns="0" rIns="0" tIns="0" bIns="0" anchor="ctr"/>
           <a:p>
-            <a:endParaRPr/>
-          </a:p>
-        </p:txBody>
-      </p:sp>
-      <p:sp>
-        <p:nvSpPr>
-          <p:cNvPr id="30" name="PlaceHolder 2"/>
+            <a:pPr algn="ctr"/>
+            <a:endParaRPr/>
+          </a:p>
+        </p:txBody>
+      </p:sp>
+      <p:sp>
+        <p:nvSpPr>
+          <p:cNvPr id="27" name="PlaceHolder 2"/>
           <p:cNvSpPr>
             <a:spLocks noGrp="1"/>
           </p:cNvSpPr>
@@ -212,7 +214,7 @@
       </p:sp>
       <p:sp>
         <p:nvSpPr>
-          <p:cNvPr id="31" name="PlaceHolder 3"/>
+          <p:cNvPr id="28" name="PlaceHolder 3"/>
           <p:cNvSpPr>
             <a:spLocks noGrp="1"/>
           </p:cNvSpPr>
@@ -238,7 +240,7 @@
       </p:sp>
       <p:sp>
         <p:nvSpPr>
-          <p:cNvPr id="32" name="PlaceHolder 4"/>
+          <p:cNvPr id="29" name="PlaceHolder 4"/>
           <p:cNvSpPr>
             <a:spLocks noGrp="1"/>
           </p:cNvSpPr>
@@ -264,7 +266,7 @@
       </p:sp>
       <p:sp>
         <p:nvSpPr>
-          <p:cNvPr id="33" name="PlaceHolder 5"/>
+          <p:cNvPr id="30" name="PlaceHolder 5"/>
           <p:cNvSpPr>
             <a:spLocks noGrp="1"/>
           </p:cNvSpPr>
@@ -312,7 +314,7 @@
       </p:grpSpPr>
       <p:sp>
         <p:nvSpPr>
-          <p:cNvPr id="34" name="PlaceHolder 1"/>
+          <p:cNvPr id="31" name="PlaceHolder 1"/>
           <p:cNvSpPr>
             <a:spLocks noGrp="1"/>
           </p:cNvSpPr>
@@ -332,13 +334,14 @@
         <p:txBody>
           <a:bodyPr lIns="0" rIns="0" tIns="0" bIns="0" anchor="ctr"/>
           <a:p>
-            <a:endParaRPr/>
-          </a:p>
-        </p:txBody>
-      </p:sp>
-      <p:sp>
-        <p:nvSpPr>
-          <p:cNvPr id="35" name="PlaceHolder 2"/>
+            <a:pPr algn="ctr"/>
+            <a:endParaRPr/>
+          </a:p>
+        </p:txBody>
+      </p:sp>
+      <p:sp>
+        <p:nvSpPr>
+          <p:cNvPr id="32" name="PlaceHolder 2"/>
           <p:cNvSpPr>
             <a:spLocks noGrp="1"/>
           </p:cNvSpPr>
@@ -364,7 +367,7 @@
       </p:sp>
       <p:sp>
         <p:nvSpPr>
-          <p:cNvPr id="36" name="PlaceHolder 3"/>
+          <p:cNvPr id="33" name="PlaceHolder 3"/>
           <p:cNvSpPr>
             <a:spLocks noGrp="1"/>
           </p:cNvSpPr>
@@ -390,7 +393,7 @@
       </p:sp>
       <p:pic>
         <p:nvPicPr>
-          <p:cNvPr id="37" name="" descr=""/>
+          <p:cNvPr id="34" name="" descr=""/>
           <p:cNvPicPr/>
           <p:nvPr/>
         </p:nvPicPr>
@@ -415,7 +418,7 @@
       </p:pic>
       <p:pic>
         <p:nvPicPr>
-          <p:cNvPr id="38" name="" descr=""/>
+          <p:cNvPr id="35" name="" descr=""/>
           <p:cNvPicPr/>
           <p:nvPr/>
         </p:nvPicPr>
@@ -484,7 +487,7 @@
       </p:grpSpPr>
       <p:sp>
         <p:nvSpPr>
-          <p:cNvPr id="44" name="PlaceHolder 1"/>
+          <p:cNvPr id="38" name="PlaceHolder 1"/>
           <p:cNvSpPr>
             <a:spLocks noGrp="1"/>
           </p:cNvSpPr>
@@ -504,13 +507,14 @@
         <p:txBody>
           <a:bodyPr lIns="0" rIns="0" tIns="0" bIns="0" anchor="ctr"/>
           <a:p>
-            <a:endParaRPr/>
-          </a:p>
-        </p:txBody>
-      </p:sp>
-      <p:sp>
-        <p:nvSpPr>
-          <p:cNvPr id="45" name="PlaceHolder 2"/>
+            <a:pPr algn="ctr"/>
+            <a:endParaRPr/>
+          </a:p>
+        </p:txBody>
+      </p:sp>
+      <p:sp>
+        <p:nvSpPr>
+          <p:cNvPr id="39" name="PlaceHolder 2"/>
           <p:cNvSpPr>
             <a:spLocks noGrp="1"/>
           </p:cNvSpPr>
@@ -559,7 +563,7 @@
       </p:grpSpPr>
       <p:sp>
         <p:nvSpPr>
-          <p:cNvPr id="46" name="PlaceHolder 1"/>
+          <p:cNvPr id="40" name="PlaceHolder 1"/>
           <p:cNvSpPr>
             <a:spLocks noGrp="1"/>
           </p:cNvSpPr>
@@ -579,13 +583,14 @@
         <p:txBody>
           <a:bodyPr lIns="0" rIns="0" tIns="0" bIns="0" anchor="ctr"/>
           <a:p>
-            <a:endParaRPr/>
-          </a:p>
-        </p:txBody>
-      </p:sp>
-      <p:sp>
-        <p:nvSpPr>
-          <p:cNvPr id="47" name="PlaceHolder 2"/>
+            <a:pPr algn="ctr"/>
+            <a:endParaRPr/>
+          </a:p>
+        </p:txBody>
+      </p:sp>
+      <p:sp>
+        <p:nvSpPr>
+          <p:cNvPr id="41" name="PlaceHolder 2"/>
           <p:cNvSpPr>
             <a:spLocks noGrp="1"/>
           </p:cNvSpPr>
@@ -633,7 +638,7 @@
       </p:grpSpPr>
       <p:sp>
         <p:nvSpPr>
-          <p:cNvPr id="48" name="PlaceHolder 1"/>
+          <p:cNvPr id="42" name="PlaceHolder 1"/>
           <p:cNvSpPr>
             <a:spLocks noGrp="1"/>
           </p:cNvSpPr>
@@ -653,13 +658,14 @@
         <p:txBody>
           <a:bodyPr lIns="0" rIns="0" tIns="0" bIns="0" anchor="ctr"/>
           <a:p>
-            <a:endParaRPr/>
-          </a:p>
-        </p:txBody>
-      </p:sp>
-      <p:sp>
-        <p:nvSpPr>
-          <p:cNvPr id="49" name="PlaceHolder 2"/>
+            <a:pPr algn="ctr"/>
+            <a:endParaRPr/>
+          </a:p>
+        </p:txBody>
+      </p:sp>
+      <p:sp>
+        <p:nvSpPr>
+          <p:cNvPr id="43" name="PlaceHolder 2"/>
           <p:cNvSpPr>
             <a:spLocks noGrp="1"/>
           </p:cNvSpPr>
@@ -685,7 +691,7 @@
       </p:sp>
       <p:sp>
         <p:nvSpPr>
-          <p:cNvPr id="50" name="PlaceHolder 3"/>
+          <p:cNvPr id="44" name="PlaceHolder 3"/>
           <p:cNvSpPr>
             <a:spLocks noGrp="1"/>
           </p:cNvSpPr>
@@ -733,7 +739,7 @@
       </p:grpSpPr>
       <p:sp>
         <p:nvSpPr>
-          <p:cNvPr id="51" name="PlaceHolder 1"/>
+          <p:cNvPr id="45" name="PlaceHolder 1"/>
           <p:cNvSpPr>
             <a:spLocks noGrp="1"/>
           </p:cNvSpPr>
@@ -753,6 +759,7 @@
         <p:txBody>
           <a:bodyPr lIns="0" rIns="0" tIns="0" bIns="0" anchor="ctr"/>
           <a:p>
+            <a:pPr algn="ctr"/>
             <a:endParaRPr/>
           </a:p>
         </p:txBody>
@@ -781,7 +788,7 @@
       </p:grpSpPr>
       <p:sp>
         <p:nvSpPr>
-          <p:cNvPr id="52" name="PlaceHolder 1"/>
+          <p:cNvPr id="46" name="PlaceHolder 1"/>
           <p:cNvSpPr>
             <a:spLocks noGrp="1"/>
           </p:cNvSpPr>
@@ -830,7 +837,7 @@
       </p:grpSpPr>
       <p:sp>
         <p:nvSpPr>
-          <p:cNvPr id="53" name="PlaceHolder 1"/>
+          <p:cNvPr id="47" name="PlaceHolder 1"/>
           <p:cNvSpPr>
             <a:spLocks noGrp="1"/>
           </p:cNvSpPr>
@@ -850,13 +857,14 @@
         <p:txBody>
           <a:bodyPr lIns="0" rIns="0" tIns="0" bIns="0" anchor="ctr"/>
           <a:p>
-            <a:endParaRPr/>
-          </a:p>
-        </p:txBody>
-      </p:sp>
-      <p:sp>
-        <p:nvSpPr>
-          <p:cNvPr id="54" name="PlaceHolder 2"/>
+            <a:pPr algn="ctr"/>
+            <a:endParaRPr/>
+          </a:p>
+        </p:txBody>
+      </p:sp>
+      <p:sp>
+        <p:nvSpPr>
+          <p:cNvPr id="48" name="PlaceHolder 2"/>
           <p:cNvSpPr>
             <a:spLocks noGrp="1"/>
           </p:cNvSpPr>
@@ -882,7 +890,7 @@
       </p:sp>
       <p:sp>
         <p:nvSpPr>
-          <p:cNvPr id="55" name="PlaceHolder 3"/>
+          <p:cNvPr id="49" name="PlaceHolder 3"/>
           <p:cNvSpPr>
             <a:spLocks noGrp="1"/>
           </p:cNvSpPr>
@@ -908,7 +916,7 @@
       </p:sp>
       <p:sp>
         <p:nvSpPr>
-          <p:cNvPr id="56" name="PlaceHolder 4"/>
+          <p:cNvPr id="50" name="PlaceHolder 4"/>
           <p:cNvSpPr>
             <a:spLocks noGrp="1"/>
           </p:cNvSpPr>
@@ -956,7 +964,7 @@
       </p:grpSpPr>
       <p:sp>
         <p:nvSpPr>
-          <p:cNvPr id="5" name="PlaceHolder 1"/>
+          <p:cNvPr id="2" name="PlaceHolder 1"/>
           <p:cNvSpPr>
             <a:spLocks noGrp="1"/>
           </p:cNvSpPr>
@@ -976,13 +984,14 @@
         <p:txBody>
           <a:bodyPr lIns="0" rIns="0" tIns="0" bIns="0" anchor="ctr"/>
           <a:p>
-            <a:endParaRPr/>
-          </a:p>
-        </p:txBody>
-      </p:sp>
-      <p:sp>
-        <p:nvSpPr>
-          <p:cNvPr id="6" name="PlaceHolder 2"/>
+            <a:pPr algn="ctr"/>
+            <a:endParaRPr/>
+          </a:p>
+        </p:txBody>
+      </p:sp>
+      <p:sp>
+        <p:nvSpPr>
+          <p:cNvPr id="3" name="PlaceHolder 2"/>
           <p:cNvSpPr>
             <a:spLocks noGrp="1"/>
           </p:cNvSpPr>
@@ -1031,7 +1040,7 @@
       </p:grpSpPr>
       <p:sp>
         <p:nvSpPr>
-          <p:cNvPr id="57" name="PlaceHolder 1"/>
+          <p:cNvPr id="51" name="PlaceHolder 1"/>
           <p:cNvSpPr>
             <a:spLocks noGrp="1"/>
           </p:cNvSpPr>
@@ -1051,13 +1060,14 @@
         <p:txBody>
           <a:bodyPr lIns="0" rIns="0" tIns="0" bIns="0" anchor="ctr"/>
           <a:p>
-            <a:endParaRPr/>
-          </a:p>
-        </p:txBody>
-      </p:sp>
-      <p:sp>
-        <p:nvSpPr>
-          <p:cNvPr id="58" name="PlaceHolder 2"/>
+            <a:pPr algn="ctr"/>
+            <a:endParaRPr/>
+          </a:p>
+        </p:txBody>
+      </p:sp>
+      <p:sp>
+        <p:nvSpPr>
+          <p:cNvPr id="52" name="PlaceHolder 2"/>
           <p:cNvSpPr>
             <a:spLocks noGrp="1"/>
           </p:cNvSpPr>
@@ -1083,7 +1093,7 @@
       </p:sp>
       <p:sp>
         <p:nvSpPr>
-          <p:cNvPr id="59" name="PlaceHolder 3"/>
+          <p:cNvPr id="53" name="PlaceHolder 3"/>
           <p:cNvSpPr>
             <a:spLocks noGrp="1"/>
           </p:cNvSpPr>
@@ -1109,7 +1119,7 @@
       </p:sp>
       <p:sp>
         <p:nvSpPr>
-          <p:cNvPr id="60" name="PlaceHolder 4"/>
+          <p:cNvPr id="54" name="PlaceHolder 4"/>
           <p:cNvSpPr>
             <a:spLocks noGrp="1"/>
           </p:cNvSpPr>
@@ -1157,7 +1167,7 @@
       </p:grpSpPr>
       <p:sp>
         <p:nvSpPr>
-          <p:cNvPr id="61" name="PlaceHolder 1"/>
+          <p:cNvPr id="55" name="PlaceHolder 1"/>
           <p:cNvSpPr>
             <a:spLocks noGrp="1"/>
           </p:cNvSpPr>
@@ -1177,13 +1187,14 @@
         <p:txBody>
           <a:bodyPr lIns="0" rIns="0" tIns="0" bIns="0" anchor="ctr"/>
           <a:p>
-            <a:endParaRPr/>
-          </a:p>
-        </p:txBody>
-      </p:sp>
-      <p:sp>
-        <p:nvSpPr>
-          <p:cNvPr id="62" name="PlaceHolder 2"/>
+            <a:pPr algn="ctr"/>
+            <a:endParaRPr/>
+          </a:p>
+        </p:txBody>
+      </p:sp>
+      <p:sp>
+        <p:nvSpPr>
+          <p:cNvPr id="56" name="PlaceHolder 2"/>
           <p:cNvSpPr>
             <a:spLocks noGrp="1"/>
           </p:cNvSpPr>
@@ -1209,7 +1220,7 @@
       </p:sp>
       <p:sp>
         <p:nvSpPr>
-          <p:cNvPr id="63" name="PlaceHolder 3"/>
+          <p:cNvPr id="57" name="PlaceHolder 3"/>
           <p:cNvSpPr>
             <a:spLocks noGrp="1"/>
           </p:cNvSpPr>
@@ -1235,7 +1246,7 @@
       </p:sp>
       <p:sp>
         <p:nvSpPr>
-          <p:cNvPr id="64" name="PlaceHolder 4"/>
+          <p:cNvPr id="58" name="PlaceHolder 4"/>
           <p:cNvSpPr>
             <a:spLocks noGrp="1"/>
           </p:cNvSpPr>
@@ -1283,7 +1294,7 @@
       </p:grpSpPr>
       <p:sp>
         <p:nvSpPr>
-          <p:cNvPr id="65" name="PlaceHolder 1"/>
+          <p:cNvPr id="59" name="PlaceHolder 1"/>
           <p:cNvSpPr>
             <a:spLocks noGrp="1"/>
           </p:cNvSpPr>
@@ -1303,13 +1314,14 @@
         <p:txBody>
           <a:bodyPr lIns="0" rIns="0" tIns="0" bIns="0" anchor="ctr"/>
           <a:p>
-            <a:endParaRPr/>
-          </a:p>
-        </p:txBody>
-      </p:sp>
-      <p:sp>
-        <p:nvSpPr>
-          <p:cNvPr id="66" name="PlaceHolder 2"/>
+            <a:pPr algn="ctr"/>
+            <a:endParaRPr/>
+          </a:p>
+        </p:txBody>
+      </p:sp>
+      <p:sp>
+        <p:nvSpPr>
+          <p:cNvPr id="60" name="PlaceHolder 2"/>
           <p:cNvSpPr>
             <a:spLocks noGrp="1"/>
           </p:cNvSpPr>
@@ -1335,7 +1347,7 @@
       </p:sp>
       <p:sp>
         <p:nvSpPr>
-          <p:cNvPr id="67" name="PlaceHolder 3"/>
+          <p:cNvPr id="61" name="PlaceHolder 3"/>
           <p:cNvSpPr>
             <a:spLocks noGrp="1"/>
           </p:cNvSpPr>
@@ -1383,7 +1395,7 @@
       </p:grpSpPr>
       <p:sp>
         <p:nvSpPr>
-          <p:cNvPr id="68" name="PlaceHolder 1"/>
+          <p:cNvPr id="62" name="PlaceHolder 1"/>
           <p:cNvSpPr>
             <a:spLocks noGrp="1"/>
           </p:cNvSpPr>
@@ -1403,13 +1415,14 @@
         <p:txBody>
           <a:bodyPr lIns="0" rIns="0" tIns="0" bIns="0" anchor="ctr"/>
           <a:p>
-            <a:endParaRPr/>
-          </a:p>
-        </p:txBody>
-      </p:sp>
-      <p:sp>
-        <p:nvSpPr>
-          <p:cNvPr id="69" name="PlaceHolder 2"/>
+            <a:pPr algn="ctr"/>
+            <a:endParaRPr/>
+          </a:p>
+        </p:txBody>
+      </p:sp>
+      <p:sp>
+        <p:nvSpPr>
+          <p:cNvPr id="63" name="PlaceHolder 2"/>
           <p:cNvSpPr>
             <a:spLocks noGrp="1"/>
           </p:cNvSpPr>
@@ -1435,7 +1448,7 @@
       </p:sp>
       <p:sp>
         <p:nvSpPr>
-          <p:cNvPr id="70" name="PlaceHolder 3"/>
+          <p:cNvPr id="64" name="PlaceHolder 3"/>
           <p:cNvSpPr>
             <a:spLocks noGrp="1"/>
           </p:cNvSpPr>
@@ -1461,7 +1474,7 @@
       </p:sp>
       <p:sp>
         <p:nvSpPr>
-          <p:cNvPr id="71" name="PlaceHolder 4"/>
+          <p:cNvPr id="65" name="PlaceHolder 4"/>
           <p:cNvSpPr>
             <a:spLocks noGrp="1"/>
           </p:cNvSpPr>
@@ -1487,7 +1500,7 @@
       </p:sp>
       <p:sp>
         <p:nvSpPr>
-          <p:cNvPr id="72" name="PlaceHolder 5"/>
+          <p:cNvPr id="66" name="PlaceHolder 5"/>
           <p:cNvSpPr>
             <a:spLocks noGrp="1"/>
           </p:cNvSpPr>
@@ -1535,7 +1548,7 @@
       </p:grpSpPr>
       <p:sp>
         <p:nvSpPr>
-          <p:cNvPr id="73" name="PlaceHolder 1"/>
+          <p:cNvPr id="67" name="PlaceHolder 1"/>
           <p:cNvSpPr>
             <a:spLocks noGrp="1"/>
           </p:cNvSpPr>
@@ -1555,13 +1568,14 @@
         <p:txBody>
           <a:bodyPr lIns="0" rIns="0" tIns="0" bIns="0" anchor="ctr"/>
           <a:p>
-            <a:endParaRPr/>
-          </a:p>
-        </p:txBody>
-      </p:sp>
-      <p:sp>
-        <p:nvSpPr>
-          <p:cNvPr id="74" name="PlaceHolder 2"/>
+            <a:pPr algn="ctr"/>
+            <a:endParaRPr/>
+          </a:p>
+        </p:txBody>
+      </p:sp>
+      <p:sp>
+        <p:nvSpPr>
+          <p:cNvPr id="68" name="PlaceHolder 2"/>
           <p:cNvSpPr>
             <a:spLocks noGrp="1"/>
           </p:cNvSpPr>
@@ -1587,7 +1601,7 @@
       </p:sp>
       <p:sp>
         <p:nvSpPr>
-          <p:cNvPr id="75" name="PlaceHolder 3"/>
+          <p:cNvPr id="69" name="PlaceHolder 3"/>
           <p:cNvSpPr>
             <a:spLocks noGrp="1"/>
           </p:cNvSpPr>
@@ -1613,7 +1627,7 @@
       </p:sp>
       <p:pic>
         <p:nvPicPr>
-          <p:cNvPr id="76" name="" descr=""/>
+          <p:cNvPr id="70" name="" descr=""/>
           <p:cNvPicPr/>
           <p:nvPr/>
         </p:nvPicPr>
@@ -1638,7 +1652,7 @@
       </p:pic>
       <p:pic>
         <p:nvPicPr>
-          <p:cNvPr id="77" name="" descr=""/>
+          <p:cNvPr id="71" name="" descr=""/>
           <p:cNvPicPr/>
           <p:nvPr/>
         </p:nvPicPr>
@@ -1707,7 +1721,7 @@
       </p:grpSpPr>
       <p:sp>
         <p:nvSpPr>
-          <p:cNvPr id="83" name="PlaceHolder 1"/>
+          <p:cNvPr id="74" name="PlaceHolder 1"/>
           <p:cNvSpPr>
             <a:spLocks noGrp="1"/>
           </p:cNvSpPr>
@@ -1727,13 +1741,14 @@
         <p:txBody>
           <a:bodyPr lIns="0" rIns="0" tIns="0" bIns="0" anchor="ctr"/>
           <a:p>
-            <a:endParaRPr/>
-          </a:p>
-        </p:txBody>
-      </p:sp>
-      <p:sp>
-        <p:nvSpPr>
-          <p:cNvPr id="84" name="PlaceHolder 2"/>
+            <a:pPr algn="ctr"/>
+            <a:endParaRPr/>
+          </a:p>
+        </p:txBody>
+      </p:sp>
+      <p:sp>
+        <p:nvSpPr>
+          <p:cNvPr id="75" name="PlaceHolder 2"/>
           <p:cNvSpPr>
             <a:spLocks noGrp="1"/>
           </p:cNvSpPr>
@@ -1782,7 +1797,7 @@
       </p:grpSpPr>
       <p:sp>
         <p:nvSpPr>
-          <p:cNvPr id="85" name="PlaceHolder 1"/>
+          <p:cNvPr id="76" name="PlaceHolder 1"/>
           <p:cNvSpPr>
             <a:spLocks noGrp="1"/>
           </p:cNvSpPr>
@@ -1802,13 +1817,14 @@
         <p:txBody>
           <a:bodyPr lIns="0" rIns="0" tIns="0" bIns="0" anchor="ctr"/>
           <a:p>
-            <a:endParaRPr/>
-          </a:p>
-        </p:txBody>
-      </p:sp>
-      <p:sp>
-        <p:nvSpPr>
-          <p:cNvPr id="86" name="PlaceHolder 2"/>
+            <a:pPr algn="ctr"/>
+            <a:endParaRPr/>
+          </a:p>
+        </p:txBody>
+      </p:sp>
+      <p:sp>
+        <p:nvSpPr>
+          <p:cNvPr id="77" name="PlaceHolder 2"/>
           <p:cNvSpPr>
             <a:spLocks noGrp="1"/>
           </p:cNvSpPr>
@@ -1856,7 +1872,7 @@
       </p:grpSpPr>
       <p:sp>
         <p:nvSpPr>
-          <p:cNvPr id="87" name="PlaceHolder 1"/>
+          <p:cNvPr id="78" name="PlaceHolder 1"/>
           <p:cNvSpPr>
             <a:spLocks noGrp="1"/>
           </p:cNvSpPr>
@@ -1876,13 +1892,14 @@
         <p:txBody>
           <a:bodyPr lIns="0" rIns="0" tIns="0" bIns="0" anchor="ctr"/>
           <a:p>
-            <a:endParaRPr/>
-          </a:p>
-        </p:txBody>
-      </p:sp>
-      <p:sp>
-        <p:nvSpPr>
-          <p:cNvPr id="88" name="PlaceHolder 2"/>
+            <a:pPr algn="ctr"/>
+            <a:endParaRPr/>
+          </a:p>
+        </p:txBody>
+      </p:sp>
+      <p:sp>
+        <p:nvSpPr>
+          <p:cNvPr id="79" name="PlaceHolder 2"/>
           <p:cNvSpPr>
             <a:spLocks noGrp="1"/>
           </p:cNvSpPr>
@@ -1908,7 +1925,7 @@
       </p:sp>
       <p:sp>
         <p:nvSpPr>
-          <p:cNvPr id="89" name="PlaceHolder 3"/>
+          <p:cNvPr id="80" name="PlaceHolder 3"/>
           <p:cNvSpPr>
             <a:spLocks noGrp="1"/>
           </p:cNvSpPr>
@@ -1956,7 +1973,7 @@
       </p:grpSpPr>
       <p:sp>
         <p:nvSpPr>
-          <p:cNvPr id="90" name="PlaceHolder 1"/>
+          <p:cNvPr id="81" name="PlaceHolder 1"/>
           <p:cNvSpPr>
             <a:spLocks noGrp="1"/>
           </p:cNvSpPr>
@@ -1976,6 +1993,7 @@
         <p:txBody>
           <a:bodyPr lIns="0" rIns="0" tIns="0" bIns="0" anchor="ctr"/>
           <a:p>
+            <a:pPr algn="ctr"/>
             <a:endParaRPr/>
           </a:p>
         </p:txBody>
@@ -2004,7 +2022,7 @@
       </p:grpSpPr>
       <p:sp>
         <p:nvSpPr>
-          <p:cNvPr id="7" name="PlaceHolder 1"/>
+          <p:cNvPr id="4" name="PlaceHolder 1"/>
           <p:cNvSpPr>
             <a:spLocks noGrp="1"/>
           </p:cNvSpPr>
@@ -2024,13 +2042,14 @@
         <p:txBody>
           <a:bodyPr lIns="0" rIns="0" tIns="0" bIns="0" anchor="ctr"/>
           <a:p>
-            <a:endParaRPr/>
-          </a:p>
-        </p:txBody>
-      </p:sp>
-      <p:sp>
-        <p:nvSpPr>
-          <p:cNvPr id="8" name="PlaceHolder 2"/>
+            <a:pPr algn="ctr"/>
+            <a:endParaRPr/>
+          </a:p>
+        </p:txBody>
+      </p:sp>
+      <p:sp>
+        <p:nvSpPr>
+          <p:cNvPr id="5" name="PlaceHolder 2"/>
           <p:cNvSpPr>
             <a:spLocks noGrp="1"/>
           </p:cNvSpPr>
@@ -2078,7 +2097,7 @@
       </p:grpSpPr>
       <p:sp>
         <p:nvSpPr>
-          <p:cNvPr id="91" name="PlaceHolder 1"/>
+          <p:cNvPr id="82" name="PlaceHolder 1"/>
           <p:cNvSpPr>
             <a:spLocks noGrp="1"/>
           </p:cNvSpPr>
@@ -2127,7 +2146,7 @@
       </p:grpSpPr>
       <p:sp>
         <p:nvSpPr>
-          <p:cNvPr id="92" name="PlaceHolder 1"/>
+          <p:cNvPr id="83" name="PlaceHolder 1"/>
           <p:cNvSpPr>
             <a:spLocks noGrp="1"/>
           </p:cNvSpPr>
@@ -2147,13 +2166,14 @@
         <p:txBody>
           <a:bodyPr lIns="0" rIns="0" tIns="0" bIns="0" anchor="ctr"/>
           <a:p>
-            <a:endParaRPr/>
-          </a:p>
-        </p:txBody>
-      </p:sp>
-      <p:sp>
-        <p:nvSpPr>
-          <p:cNvPr id="93" name="PlaceHolder 2"/>
+            <a:pPr algn="ctr"/>
+            <a:endParaRPr/>
+          </a:p>
+        </p:txBody>
+      </p:sp>
+      <p:sp>
+        <p:nvSpPr>
+          <p:cNvPr id="84" name="PlaceHolder 2"/>
           <p:cNvSpPr>
             <a:spLocks noGrp="1"/>
           </p:cNvSpPr>
@@ -2179,7 +2199,7 @@
       </p:sp>
       <p:sp>
         <p:nvSpPr>
-          <p:cNvPr id="94" name="PlaceHolder 3"/>
+          <p:cNvPr id="85" name="PlaceHolder 3"/>
           <p:cNvSpPr>
             <a:spLocks noGrp="1"/>
           </p:cNvSpPr>
@@ -2205,7 +2225,7 @@
       </p:sp>
       <p:sp>
         <p:nvSpPr>
-          <p:cNvPr id="95" name="PlaceHolder 4"/>
+          <p:cNvPr id="86" name="PlaceHolder 4"/>
           <p:cNvSpPr>
             <a:spLocks noGrp="1"/>
           </p:cNvSpPr>
@@ -2253,7 +2273,7 @@
       </p:grpSpPr>
       <p:sp>
         <p:nvSpPr>
-          <p:cNvPr id="96" name="PlaceHolder 1"/>
+          <p:cNvPr id="87" name="PlaceHolder 1"/>
           <p:cNvSpPr>
             <a:spLocks noGrp="1"/>
           </p:cNvSpPr>
@@ -2273,13 +2293,14 @@
         <p:txBody>
           <a:bodyPr lIns="0" rIns="0" tIns="0" bIns="0" anchor="ctr"/>
           <a:p>
-            <a:endParaRPr/>
-          </a:p>
-        </p:txBody>
-      </p:sp>
-      <p:sp>
-        <p:nvSpPr>
-          <p:cNvPr id="97" name="PlaceHolder 2"/>
+            <a:pPr algn="ctr"/>
+            <a:endParaRPr/>
+          </a:p>
+        </p:txBody>
+      </p:sp>
+      <p:sp>
+        <p:nvSpPr>
+          <p:cNvPr id="88" name="PlaceHolder 2"/>
           <p:cNvSpPr>
             <a:spLocks noGrp="1"/>
           </p:cNvSpPr>
@@ -2305,7 +2326,7 @@
       </p:sp>
       <p:sp>
         <p:nvSpPr>
-          <p:cNvPr id="98" name="PlaceHolder 3"/>
+          <p:cNvPr id="89" name="PlaceHolder 3"/>
           <p:cNvSpPr>
             <a:spLocks noGrp="1"/>
           </p:cNvSpPr>
@@ -2331,7 +2352,7 @@
       </p:sp>
       <p:sp>
         <p:nvSpPr>
-          <p:cNvPr id="99" name="PlaceHolder 4"/>
+          <p:cNvPr id="90" name="PlaceHolder 4"/>
           <p:cNvSpPr>
             <a:spLocks noGrp="1"/>
           </p:cNvSpPr>
@@ -2379,7 +2400,7 @@
       </p:grpSpPr>
       <p:sp>
         <p:nvSpPr>
-          <p:cNvPr id="100" name="PlaceHolder 1"/>
+          <p:cNvPr id="91" name="PlaceHolder 1"/>
           <p:cNvSpPr>
             <a:spLocks noGrp="1"/>
           </p:cNvSpPr>
@@ -2399,13 +2420,14 @@
         <p:txBody>
           <a:bodyPr lIns="0" rIns="0" tIns="0" bIns="0" anchor="ctr"/>
           <a:p>
-            <a:endParaRPr/>
-          </a:p>
-        </p:txBody>
-      </p:sp>
-      <p:sp>
-        <p:nvSpPr>
-          <p:cNvPr id="101" name="PlaceHolder 2"/>
+            <a:pPr algn="ctr"/>
+            <a:endParaRPr/>
+          </a:p>
+        </p:txBody>
+      </p:sp>
+      <p:sp>
+        <p:nvSpPr>
+          <p:cNvPr id="92" name="PlaceHolder 2"/>
           <p:cNvSpPr>
             <a:spLocks noGrp="1"/>
           </p:cNvSpPr>
@@ -2431,7 +2453,7 @@
       </p:sp>
       <p:sp>
         <p:nvSpPr>
-          <p:cNvPr id="102" name="PlaceHolder 3"/>
+          <p:cNvPr id="93" name="PlaceHolder 3"/>
           <p:cNvSpPr>
             <a:spLocks noGrp="1"/>
           </p:cNvSpPr>
@@ -2457,7 +2479,7 @@
       </p:sp>
       <p:sp>
         <p:nvSpPr>
-          <p:cNvPr id="103" name="PlaceHolder 4"/>
+          <p:cNvPr id="94" name="PlaceHolder 4"/>
           <p:cNvSpPr>
             <a:spLocks noGrp="1"/>
           </p:cNvSpPr>
@@ -2505,7 +2527,7 @@
       </p:grpSpPr>
       <p:sp>
         <p:nvSpPr>
-          <p:cNvPr id="104" name="PlaceHolder 1"/>
+          <p:cNvPr id="95" name="PlaceHolder 1"/>
           <p:cNvSpPr>
             <a:spLocks noGrp="1"/>
           </p:cNvSpPr>
@@ -2525,13 +2547,14 @@
         <p:txBody>
           <a:bodyPr lIns="0" rIns="0" tIns="0" bIns="0" anchor="ctr"/>
           <a:p>
-            <a:endParaRPr/>
-          </a:p>
-        </p:txBody>
-      </p:sp>
-      <p:sp>
-        <p:nvSpPr>
-          <p:cNvPr id="105" name="PlaceHolder 2"/>
+            <a:pPr algn="ctr"/>
+            <a:endParaRPr/>
+          </a:p>
+        </p:txBody>
+      </p:sp>
+      <p:sp>
+        <p:nvSpPr>
+          <p:cNvPr id="96" name="PlaceHolder 2"/>
           <p:cNvSpPr>
             <a:spLocks noGrp="1"/>
           </p:cNvSpPr>
@@ -2557,7 +2580,7 @@
       </p:sp>
       <p:sp>
         <p:nvSpPr>
-          <p:cNvPr id="106" name="PlaceHolder 3"/>
+          <p:cNvPr id="97" name="PlaceHolder 3"/>
           <p:cNvSpPr>
             <a:spLocks noGrp="1"/>
           </p:cNvSpPr>
@@ -2605,7 +2628,7 @@
       </p:grpSpPr>
       <p:sp>
         <p:nvSpPr>
-          <p:cNvPr id="107" name="PlaceHolder 1"/>
+          <p:cNvPr id="98" name="PlaceHolder 1"/>
           <p:cNvSpPr>
             <a:spLocks noGrp="1"/>
           </p:cNvSpPr>
@@ -2625,13 +2648,14 @@
         <p:txBody>
           <a:bodyPr lIns="0" rIns="0" tIns="0" bIns="0" anchor="ctr"/>
           <a:p>
-            <a:endParaRPr/>
-          </a:p>
-        </p:txBody>
-      </p:sp>
-      <p:sp>
-        <p:nvSpPr>
-          <p:cNvPr id="108" name="PlaceHolder 2"/>
+            <a:pPr algn="ctr"/>
+            <a:endParaRPr/>
+          </a:p>
+        </p:txBody>
+      </p:sp>
+      <p:sp>
+        <p:nvSpPr>
+          <p:cNvPr id="99" name="PlaceHolder 2"/>
           <p:cNvSpPr>
             <a:spLocks noGrp="1"/>
           </p:cNvSpPr>
@@ -2657,7 +2681,7 @@
       </p:sp>
       <p:sp>
         <p:nvSpPr>
-          <p:cNvPr id="109" name="PlaceHolder 3"/>
+          <p:cNvPr id="100" name="PlaceHolder 3"/>
           <p:cNvSpPr>
             <a:spLocks noGrp="1"/>
           </p:cNvSpPr>
@@ -2683,7 +2707,7 @@
       </p:sp>
       <p:sp>
         <p:nvSpPr>
-          <p:cNvPr id="110" name="PlaceHolder 4"/>
+          <p:cNvPr id="101" name="PlaceHolder 4"/>
           <p:cNvSpPr>
             <a:spLocks noGrp="1"/>
           </p:cNvSpPr>
@@ -2709,7 +2733,7 @@
       </p:sp>
       <p:sp>
         <p:nvSpPr>
-          <p:cNvPr id="111" name="PlaceHolder 5"/>
+          <p:cNvPr id="102" name="PlaceHolder 5"/>
           <p:cNvSpPr>
             <a:spLocks noGrp="1"/>
           </p:cNvSpPr>
@@ -2757,7 +2781,7 @@
       </p:grpSpPr>
       <p:sp>
         <p:nvSpPr>
-          <p:cNvPr id="112" name="PlaceHolder 1"/>
+          <p:cNvPr id="103" name="PlaceHolder 1"/>
           <p:cNvSpPr>
             <a:spLocks noGrp="1"/>
           </p:cNvSpPr>
@@ -2777,13 +2801,14 @@
         <p:txBody>
           <a:bodyPr lIns="0" rIns="0" tIns="0" bIns="0" anchor="ctr"/>
           <a:p>
-            <a:endParaRPr/>
-          </a:p>
-        </p:txBody>
-      </p:sp>
-      <p:sp>
-        <p:nvSpPr>
-          <p:cNvPr id="113" name="PlaceHolder 2"/>
+            <a:pPr algn="ctr"/>
+            <a:endParaRPr/>
+          </a:p>
+        </p:txBody>
+      </p:sp>
+      <p:sp>
+        <p:nvSpPr>
+          <p:cNvPr id="104" name="PlaceHolder 2"/>
           <p:cNvSpPr>
             <a:spLocks noGrp="1"/>
           </p:cNvSpPr>
@@ -2809,7 +2834,7 @@
       </p:sp>
       <p:sp>
         <p:nvSpPr>
-          <p:cNvPr id="114" name="PlaceHolder 3"/>
+          <p:cNvPr id="105" name="PlaceHolder 3"/>
           <p:cNvSpPr>
             <a:spLocks noGrp="1"/>
           </p:cNvSpPr>
@@ -2835,7 +2860,7 @@
       </p:sp>
       <p:pic>
         <p:nvPicPr>
-          <p:cNvPr id="115" name="" descr=""/>
+          <p:cNvPr id="106" name="" descr=""/>
           <p:cNvPicPr/>
           <p:nvPr/>
         </p:nvPicPr>
@@ -2860,7 +2885,7 @@
       </p:pic>
       <p:pic>
         <p:nvPicPr>
-          <p:cNvPr id="116" name="" descr=""/>
+          <p:cNvPr id="107" name="" descr=""/>
           <p:cNvPicPr/>
           <p:nvPr/>
         </p:nvPicPr>
@@ -2907,7 +2932,7 @@
       </p:grpSpPr>
       <p:sp>
         <p:nvSpPr>
-          <p:cNvPr id="9" name="PlaceHolder 1"/>
+          <p:cNvPr id="6" name="PlaceHolder 1"/>
           <p:cNvSpPr>
             <a:spLocks noGrp="1"/>
           </p:cNvSpPr>
@@ -2927,13 +2952,14 @@
         <p:txBody>
           <a:bodyPr lIns="0" rIns="0" tIns="0" bIns="0" anchor="ctr"/>
           <a:p>
-            <a:endParaRPr/>
-          </a:p>
-        </p:txBody>
-      </p:sp>
-      <p:sp>
-        <p:nvSpPr>
-          <p:cNvPr id="10" name="PlaceHolder 2"/>
+            <a:pPr algn="ctr"/>
+            <a:endParaRPr/>
+          </a:p>
+        </p:txBody>
+      </p:sp>
+      <p:sp>
+        <p:nvSpPr>
+          <p:cNvPr id="7" name="PlaceHolder 2"/>
           <p:cNvSpPr>
             <a:spLocks noGrp="1"/>
           </p:cNvSpPr>
@@ -2959,7 +2985,7 @@
       </p:sp>
       <p:sp>
         <p:nvSpPr>
-          <p:cNvPr id="11" name="PlaceHolder 3"/>
+          <p:cNvPr id="8" name="PlaceHolder 3"/>
           <p:cNvSpPr>
             <a:spLocks noGrp="1"/>
           </p:cNvSpPr>
@@ -3007,7 +3033,7 @@
       </p:grpSpPr>
       <p:sp>
         <p:nvSpPr>
-          <p:cNvPr id="12" name="PlaceHolder 1"/>
+          <p:cNvPr id="9" name="PlaceHolder 1"/>
           <p:cNvSpPr>
             <a:spLocks noGrp="1"/>
           </p:cNvSpPr>
@@ -3027,6 +3053,7 @@
         <p:txBody>
           <a:bodyPr lIns="0" rIns="0" tIns="0" bIns="0" anchor="ctr"/>
           <a:p>
+            <a:pPr algn="ctr"/>
             <a:endParaRPr/>
           </a:p>
         </p:txBody>
@@ -3055,7 +3082,7 @@
       </p:grpSpPr>
       <p:sp>
         <p:nvSpPr>
-          <p:cNvPr id="13" name="PlaceHolder 1"/>
+          <p:cNvPr id="10" name="PlaceHolder 1"/>
           <p:cNvSpPr>
             <a:spLocks noGrp="1"/>
           </p:cNvSpPr>
@@ -3104,7 +3131,7 @@
       </p:grpSpPr>
       <p:sp>
         <p:nvSpPr>
-          <p:cNvPr id="14" name="PlaceHolder 1"/>
+          <p:cNvPr id="11" name="PlaceHolder 1"/>
           <p:cNvSpPr>
             <a:spLocks noGrp="1"/>
           </p:cNvSpPr>
@@ -3124,13 +3151,14 @@
         <p:txBody>
           <a:bodyPr lIns="0" rIns="0" tIns="0" bIns="0" anchor="ctr"/>
           <a:p>
-            <a:endParaRPr/>
-          </a:p>
-        </p:txBody>
-      </p:sp>
-      <p:sp>
-        <p:nvSpPr>
-          <p:cNvPr id="15" name="PlaceHolder 2"/>
+            <a:pPr algn="ctr"/>
+            <a:endParaRPr/>
+          </a:p>
+        </p:txBody>
+      </p:sp>
+      <p:sp>
+        <p:nvSpPr>
+          <p:cNvPr id="12" name="PlaceHolder 2"/>
           <p:cNvSpPr>
             <a:spLocks noGrp="1"/>
           </p:cNvSpPr>
@@ -3156,7 +3184,7 @@
       </p:sp>
       <p:sp>
         <p:nvSpPr>
-          <p:cNvPr id="16" name="PlaceHolder 3"/>
+          <p:cNvPr id="13" name="PlaceHolder 3"/>
           <p:cNvSpPr>
             <a:spLocks noGrp="1"/>
           </p:cNvSpPr>
@@ -3182,7 +3210,7 @@
       </p:sp>
       <p:sp>
         <p:nvSpPr>
-          <p:cNvPr id="17" name="PlaceHolder 4"/>
+          <p:cNvPr id="14" name="PlaceHolder 4"/>
           <p:cNvSpPr>
             <a:spLocks noGrp="1"/>
           </p:cNvSpPr>
@@ -3230,7 +3258,7 @@
       </p:grpSpPr>
       <p:sp>
         <p:nvSpPr>
-          <p:cNvPr id="18" name="PlaceHolder 1"/>
+          <p:cNvPr id="15" name="PlaceHolder 1"/>
           <p:cNvSpPr>
             <a:spLocks noGrp="1"/>
           </p:cNvSpPr>
@@ -3250,13 +3278,14 @@
         <p:txBody>
           <a:bodyPr lIns="0" rIns="0" tIns="0" bIns="0" anchor="ctr"/>
           <a:p>
-            <a:endParaRPr/>
-          </a:p>
-        </p:txBody>
-      </p:sp>
-      <p:sp>
-        <p:nvSpPr>
-          <p:cNvPr id="19" name="PlaceHolder 2"/>
+            <a:pPr algn="ctr"/>
+            <a:endParaRPr/>
+          </a:p>
+        </p:txBody>
+      </p:sp>
+      <p:sp>
+        <p:nvSpPr>
+          <p:cNvPr id="16" name="PlaceHolder 2"/>
           <p:cNvSpPr>
             <a:spLocks noGrp="1"/>
           </p:cNvSpPr>
@@ -3282,7 +3311,7 @@
       </p:sp>
       <p:sp>
         <p:nvSpPr>
-          <p:cNvPr id="20" name="PlaceHolder 3"/>
+          <p:cNvPr id="17" name="PlaceHolder 3"/>
           <p:cNvSpPr>
             <a:spLocks noGrp="1"/>
           </p:cNvSpPr>
@@ -3308,7 +3337,7 @@
       </p:sp>
       <p:sp>
         <p:nvSpPr>
-          <p:cNvPr id="21" name="PlaceHolder 4"/>
+          <p:cNvPr id="18" name="PlaceHolder 4"/>
           <p:cNvSpPr>
             <a:spLocks noGrp="1"/>
           </p:cNvSpPr>
@@ -3356,7 +3385,7 @@
       </p:grpSpPr>
       <p:sp>
         <p:nvSpPr>
-          <p:cNvPr id="22" name="PlaceHolder 1"/>
+          <p:cNvPr id="19" name="PlaceHolder 1"/>
           <p:cNvSpPr>
             <a:spLocks noGrp="1"/>
           </p:cNvSpPr>
@@ -3376,13 +3405,14 @@
         <p:txBody>
           <a:bodyPr lIns="0" rIns="0" tIns="0" bIns="0" anchor="ctr"/>
           <a:p>
-            <a:endParaRPr/>
-          </a:p>
-        </p:txBody>
-      </p:sp>
-      <p:sp>
-        <p:nvSpPr>
-          <p:cNvPr id="23" name="PlaceHolder 2"/>
+            <a:pPr algn="ctr"/>
+            <a:endParaRPr/>
+          </a:p>
+        </p:txBody>
+      </p:sp>
+      <p:sp>
+        <p:nvSpPr>
+          <p:cNvPr id="20" name="PlaceHolder 2"/>
           <p:cNvSpPr>
             <a:spLocks noGrp="1"/>
           </p:cNvSpPr>
@@ -3408,7 +3438,7 @@
       </p:sp>
       <p:sp>
         <p:nvSpPr>
-          <p:cNvPr id="24" name="PlaceHolder 3"/>
+          <p:cNvPr id="21" name="PlaceHolder 3"/>
           <p:cNvSpPr>
             <a:spLocks noGrp="1"/>
           </p:cNvSpPr>
@@ -3434,7 +3464,7 @@
       </p:sp>
       <p:sp>
         <p:nvSpPr>
-          <p:cNvPr id="25" name="PlaceHolder 4"/>
+          <p:cNvPr id="22" name="PlaceHolder 4"/>
           <p:cNvSpPr>
             <a:spLocks noGrp="1"/>
           </p:cNvSpPr>
@@ -3499,29 +3529,21 @@
         </p:nvSpPr>
         <p:spPr>
           <a:xfrm>
-            <a:off x="1523880" y="1122480"/>
-            <a:ext cx="9143640" cy="2387160"/>
-          </a:xfrm>
-          <a:prstGeom prst="rect">
-            <a:avLst/>
-          </a:prstGeom>
-        </p:spPr>
-        <p:txBody>
-          <a:bodyPr anchor="b"/>
-          <a:p>
-            <a:pPr algn="ctr">
-              <a:lnSpc>
-                <a:spcPct val="100000"/>
-              </a:lnSpc>
-            </a:pPr>
+            <a:off x="609480" y="273600"/>
+            <a:ext cx="10972080" cy="1144800"/>
+          </a:xfrm>
+          <a:prstGeom prst="rect">
+            <a:avLst/>
+          </a:prstGeom>
+        </p:spPr>
+        <p:txBody>
+          <a:bodyPr lIns="0" rIns="0" tIns="0" bIns="0" anchor="ctr"/>
+          <a:p>
             <a:r>
-              <a:rPr lang="da-DK" sz="6000">
-                <a:solidFill>
-                  <a:srgbClr val="000000"/>
-                </a:solidFill>
-                <a:latin typeface="Calibri Light"/>
+              <a:rPr lang="en-US">
+                <a:latin typeface="Arial"/>
               </a:rPr>
-              <a:t>Click to edit the title text formatClick to edit Master title style</a:t>
+              <a:t>Click to edit the title text format</a:t>
             </a:r>
             <a:endParaRPr/>
           </a:p>
@@ -3530,112 +3552,6 @@
       <p:sp>
         <p:nvSpPr>
           <p:cNvPr id="1" name="PlaceHolder 2"/>
-          <p:cNvSpPr>
-            <a:spLocks noGrp="1"/>
-          </p:cNvSpPr>
-          <p:nvPr>
-            <p:ph type="dt"/>
-          </p:nvPr>
-        </p:nvSpPr>
-        <p:spPr>
-          <a:xfrm>
-            <a:off x="838080" y="6356520"/>
-            <a:ext cx="2742840" cy="364680"/>
-          </a:xfrm>
-          <a:prstGeom prst="rect">
-            <a:avLst/>
-          </a:prstGeom>
-        </p:spPr>
-        <p:txBody>
-          <a:bodyPr anchor="ctr"/>
-          <a:p>
-            <a:pPr>
-              <a:lnSpc>
-                <a:spcPct val="100000"/>
-              </a:lnSpc>
-            </a:pPr>
-            <a:r>
-              <a:rPr lang="en-US" sz="1200">
-                <a:solidFill>
-                  <a:srgbClr val="8b8b8b"/>
-                </a:solidFill>
-                <a:latin typeface="Calibri"/>
-              </a:rPr>
-              <a:t>3/7/19</a:t>
-            </a:r>
-            <a:endParaRPr/>
-          </a:p>
-        </p:txBody>
-      </p:sp>
-      <p:sp>
-        <p:nvSpPr>
-          <p:cNvPr id="2" name="PlaceHolder 3"/>
-          <p:cNvSpPr>
-            <a:spLocks noGrp="1"/>
-          </p:cNvSpPr>
-          <p:nvPr>
-            <p:ph type="ftr"/>
-          </p:nvPr>
-        </p:nvSpPr>
-        <p:spPr>
-          <a:xfrm>
-            <a:off x="4038480" y="6356520"/>
-            <a:ext cx="4114440" cy="364680"/>
-          </a:xfrm>
-          <a:prstGeom prst="rect">
-            <a:avLst/>
-          </a:prstGeom>
-        </p:spPr>
-        <p:txBody>
-          <a:bodyPr anchor="ctr"/>
-          <a:p>
-            <a:endParaRPr/>
-          </a:p>
-        </p:txBody>
-      </p:sp>
-      <p:sp>
-        <p:nvSpPr>
-          <p:cNvPr id="3" name="PlaceHolder 4"/>
-          <p:cNvSpPr>
-            <a:spLocks noGrp="1"/>
-          </p:cNvSpPr>
-          <p:nvPr>
-            <p:ph type="sldNum"/>
-          </p:nvPr>
-        </p:nvSpPr>
-        <p:spPr>
-          <a:xfrm>
-            <a:off x="8610480" y="6356520"/>
-            <a:ext cx="2742840" cy="364680"/>
-          </a:xfrm>
-          <a:prstGeom prst="rect">
-            <a:avLst/>
-          </a:prstGeom>
-        </p:spPr>
-        <p:txBody>
-          <a:bodyPr anchor="ctr"/>
-          <a:p>
-            <a:pPr algn="r">
-              <a:lnSpc>
-                <a:spcPct val="100000"/>
-              </a:lnSpc>
-            </a:pPr>
-            <a:fld id="{64B04A53-09F2-4929-9710-65970F70BFF8}" type="slidenum">
-              <a:rPr lang="en-US" sz="1200">
-                <a:solidFill>
-                  <a:srgbClr val="8b8b8b"/>
-                </a:solidFill>
-                <a:latin typeface="Calibri"/>
-              </a:rPr>
-              <a:t>&lt;number&gt;</a:t>
-            </a:fld>
-            <a:endParaRPr/>
-          </a:p>
-        </p:txBody>
-      </p:sp>
-      <p:sp>
-        <p:nvSpPr>
-          <p:cNvPr id="4" name="PlaceHolder 5"/>
           <p:cNvSpPr>
             <a:spLocks noGrp="1"/>
           </p:cNvSpPr>
@@ -3661,8 +3577,8 @@
               <a:buChar char=""/>
             </a:pPr>
             <a:r>
-              <a:rPr lang="da-DK" sz="2800">
-                <a:latin typeface="Calibri"/>
+              <a:rPr lang="en-US" sz="3200">
+                <a:latin typeface="Arial"/>
               </a:rPr>
               <a:t>Click to edit the outline text format</a:t>
             </a:r>
@@ -3675,8 +3591,8 @@
               <a:buChar char=""/>
             </a:pPr>
             <a:r>
-              <a:rPr lang="da-DK" sz="2000">
-                <a:latin typeface="Calibri"/>
+              <a:rPr lang="en-US" sz="2800">
+                <a:latin typeface="Arial"/>
               </a:rPr>
               <a:t>Second Outline Level</a:t>
             </a:r>
@@ -3689,8 +3605,8 @@
               <a:buChar char=""/>
             </a:pPr>
             <a:r>
-              <a:rPr lang="da-DK">
-                <a:latin typeface="Calibri"/>
+              <a:rPr lang="en-US" sz="2400">
+                <a:latin typeface="Arial"/>
               </a:rPr>
               <a:t>Third Outline Level</a:t>
             </a:r>
@@ -3703,8 +3619,8 @@
               <a:buChar char=""/>
             </a:pPr>
             <a:r>
-              <a:rPr lang="da-DK">
-                <a:latin typeface="Calibri"/>
+              <a:rPr lang="en-US" sz="2000">
+                <a:latin typeface="Arial"/>
               </a:rPr>
               <a:t>Fourth Outline Level</a:t>
             </a:r>
@@ -3717,8 +3633,8 @@
               <a:buChar char=""/>
             </a:pPr>
             <a:r>
-              <a:rPr lang="da-DK" sz="2000">
-                <a:latin typeface="Calibri"/>
+              <a:rPr lang="en-US" sz="2000">
+                <a:latin typeface="Arial"/>
               </a:rPr>
               <a:t>Fifth Outline Level</a:t>
             </a:r>
@@ -3731,8 +3647,8 @@
               <a:buChar char=""/>
             </a:pPr>
             <a:r>
-              <a:rPr lang="da-DK" sz="2000">
-                <a:latin typeface="Calibri"/>
+              <a:rPr lang="en-US" sz="2000">
+                <a:latin typeface="Arial"/>
               </a:rPr>
               <a:t>Sixth Outline Level</a:t>
             </a:r>
@@ -3745,8 +3661,8 @@
               <a:buChar char=""/>
             </a:pPr>
             <a:r>
-              <a:rPr lang="da-DK" sz="2000">
-                <a:latin typeface="Calibri"/>
+              <a:rPr lang="en-US" sz="2000">
+                <a:latin typeface="Arial"/>
               </a:rPr>
               <a:t>Seventh Outline Level</a:t>
             </a:r>
@@ -3800,7 +3716,7 @@
       </p:grpSpPr>
       <p:sp>
         <p:nvSpPr>
-          <p:cNvPr id="39" name="PlaceHolder 1"/>
+          <p:cNvPr id="36" name="PlaceHolder 1"/>
           <p:cNvSpPr>
             <a:spLocks noGrp="1"/>
           </p:cNvSpPr>
@@ -3810,29 +3726,22 @@
         </p:nvSpPr>
         <p:spPr>
           <a:xfrm>
-            <a:off x="838080" y="365040"/>
-            <a:ext cx="10515240" cy="1325160"/>
-          </a:xfrm>
-          <a:prstGeom prst="rect">
-            <a:avLst/>
-          </a:prstGeom>
-        </p:spPr>
-        <p:txBody>
-          <a:bodyPr anchor="ctr"/>
-          <a:p>
-            <a:pPr>
-              <a:lnSpc>
-                <a:spcPct val="90000"/>
-              </a:lnSpc>
-            </a:pPr>
+            <a:off x="609480" y="273600"/>
+            <a:ext cx="10972440" cy="1144800"/>
+          </a:xfrm>
+          <a:prstGeom prst="rect">
+            <a:avLst/>
+          </a:prstGeom>
+        </p:spPr>
+        <p:txBody>
+          <a:bodyPr lIns="0" rIns="0" tIns="0" bIns="0" anchor="ctr"/>
+          <a:p>
+            <a:pPr algn="ctr"/>
             <a:r>
-              <a:rPr lang="da-DK" sz="4400">
-                <a:solidFill>
-                  <a:srgbClr val="000000"/>
-                </a:solidFill>
-                <a:latin typeface="Calibri Light"/>
+              <a:rPr lang="en-US" sz="4400">
+                <a:latin typeface="Arial"/>
               </a:rPr>
-              <a:t>Click to edit the title text formatClick to edit Master title style</a:t>
+              <a:t>Click to edit the title text format</a:t>
             </a:r>
             <a:endParaRPr/>
           </a:p>
@@ -3840,25 +3749,25 @@
       </p:sp>
       <p:sp>
         <p:nvSpPr>
-          <p:cNvPr id="40" name="PlaceHolder 2"/>
-          <p:cNvSpPr>
-            <a:spLocks noGrp="1"/>
-          </p:cNvSpPr>
-          <p:nvPr>
-            <p:ph type="body"/>
-          </p:nvPr>
-        </p:nvSpPr>
-        <p:spPr>
-          <a:xfrm>
-            <a:off x="838080" y="1825560"/>
-            <a:ext cx="10515240" cy="4350960"/>
-          </a:xfrm>
-          <a:prstGeom prst="rect">
-            <a:avLst/>
-          </a:prstGeom>
-        </p:spPr>
-        <p:txBody>
-          <a:bodyPr/>
+          <p:cNvPr id="37" name="PlaceHolder 2"/>
+          <p:cNvSpPr>
+            <a:spLocks noGrp="1"/>
+          </p:cNvSpPr>
+          <p:nvPr>
+            <p:ph type="body"/>
+          </p:nvPr>
+        </p:nvSpPr>
+        <p:spPr>
+          <a:xfrm>
+            <a:off x="609480" y="1604520"/>
+            <a:ext cx="10972440" cy="3977280"/>
+          </a:xfrm>
+          <a:prstGeom prst="rect">
+            <a:avLst/>
+          </a:prstGeom>
+        </p:spPr>
+        <p:txBody>
+          <a:bodyPr lIns="0" rIns="0" tIns="0" bIns="0"/>
           <a:p>
             <a:pPr>
               <a:buSzPct val="45000"/>
@@ -3866,11 +3775,8 @@
               <a:buChar char=""/>
             </a:pPr>
             <a:r>
-              <a:rPr lang="da-DK" sz="2800">
-                <a:solidFill>
-                  <a:srgbClr val="000000"/>
-                </a:solidFill>
-                <a:latin typeface="Calibri"/>
+              <a:rPr lang="en-US" sz="3200">
+                <a:latin typeface="Arial"/>
               </a:rPr>
               <a:t>Click to edit the outline text format</a:t>
             </a:r>
@@ -3883,11 +3789,8 @@
               <a:buChar char=""/>
             </a:pPr>
             <a:r>
-              <a:rPr lang="da-DK" sz="2800">
-                <a:solidFill>
-                  <a:srgbClr val="000000"/>
-                </a:solidFill>
-                <a:latin typeface="Calibri"/>
+              <a:rPr lang="en-US" sz="2800">
+                <a:latin typeface="Arial"/>
               </a:rPr>
               <a:t>Second Outline Level</a:t>
             </a:r>
@@ -3900,11 +3803,8 @@
               <a:buChar char=""/>
             </a:pPr>
             <a:r>
-              <a:rPr lang="da-DK" sz="2800">
-                <a:solidFill>
-                  <a:srgbClr val="000000"/>
-                </a:solidFill>
-                <a:latin typeface="Calibri"/>
+              <a:rPr lang="en-US" sz="2400">
+                <a:latin typeface="Arial"/>
               </a:rPr>
               <a:t>Third Outline Level</a:t>
             </a:r>
@@ -3917,11 +3817,8 @@
               <a:buChar char=""/>
             </a:pPr>
             <a:r>
-              <a:rPr lang="da-DK" sz="2800">
-                <a:solidFill>
-                  <a:srgbClr val="000000"/>
-                </a:solidFill>
-                <a:latin typeface="Calibri"/>
+              <a:rPr lang="en-US" sz="2000">
+                <a:latin typeface="Arial"/>
               </a:rPr>
               <a:t>Fourth Outline Level</a:t>
             </a:r>
@@ -3934,11 +3831,8 @@
               <a:buChar char=""/>
             </a:pPr>
             <a:r>
-              <a:rPr lang="da-DK" sz="2800">
-                <a:solidFill>
-                  <a:srgbClr val="000000"/>
-                </a:solidFill>
-                <a:latin typeface="Calibri"/>
+              <a:rPr lang="en-US" sz="2000">
+                <a:latin typeface="Arial"/>
               </a:rPr>
               <a:t>Fifth Outline Level</a:t>
             </a:r>
@@ -3951,215 +3845,25 @@
               <a:buChar char=""/>
             </a:pPr>
             <a:r>
-              <a:rPr lang="da-DK" sz="2800">
-                <a:solidFill>
-                  <a:srgbClr val="000000"/>
-                </a:solidFill>
-                <a:latin typeface="Calibri"/>
+              <a:rPr lang="en-US" sz="2000">
+                <a:latin typeface="Arial"/>
               </a:rPr>
               <a:t>Sixth Outline Level</a:t>
             </a:r>
             <a:endParaRPr/>
           </a:p>
           <a:p>
-            <a:pPr>
-              <a:lnSpc>
-                <a:spcPct val="100000"/>
-              </a:lnSpc>
-              <a:buFont typeface="Arial"/>
-              <a:buChar char="•"/>
+            <a:pPr lvl="6">
+              <a:buSzPct val="45000"/>
+              <a:buFont typeface="StarSymbol"/>
+              <a:buChar char=""/>
             </a:pPr>
             <a:r>
-              <a:rPr lang="da-DK" sz="2800">
-                <a:solidFill>
-                  <a:srgbClr val="000000"/>
-                </a:solidFill>
-                <a:latin typeface="Calibri"/>
+              <a:rPr lang="en-US" sz="2000">
+                <a:latin typeface="Arial"/>
               </a:rPr>
-              <a:t>Seventh Outline LevelEdit Master text styles</a:t>
+              <a:t>Seventh Outline Level</a:t>
             </a:r>
-            <a:endParaRPr/>
-          </a:p>
-          <a:p>
-            <a:pPr lvl="1">
-              <a:lnSpc>
-                <a:spcPct val="100000"/>
-              </a:lnSpc>
-              <a:buFont typeface="Arial"/>
-              <a:buChar char="•"/>
-            </a:pPr>
-            <a:r>
-              <a:rPr lang="da-DK" sz="2400">
-                <a:solidFill>
-                  <a:srgbClr val="000000"/>
-                </a:solidFill>
-                <a:latin typeface="Calibri"/>
-              </a:rPr>
-              <a:t>Second level</a:t>
-            </a:r>
-            <a:endParaRPr/>
-          </a:p>
-          <a:p>
-            <a:pPr lvl="2">
-              <a:lnSpc>
-                <a:spcPct val="100000"/>
-              </a:lnSpc>
-              <a:buFont typeface="Arial"/>
-              <a:buChar char="•"/>
-            </a:pPr>
-            <a:r>
-              <a:rPr lang="da-DK" sz="2000">
-                <a:solidFill>
-                  <a:srgbClr val="000000"/>
-                </a:solidFill>
-                <a:latin typeface="Calibri"/>
-              </a:rPr>
-              <a:t>Third level</a:t>
-            </a:r>
-            <a:endParaRPr/>
-          </a:p>
-          <a:p>
-            <a:pPr lvl="3">
-              <a:lnSpc>
-                <a:spcPct val="100000"/>
-              </a:lnSpc>
-              <a:buFont typeface="Arial"/>
-              <a:buChar char="•"/>
-            </a:pPr>
-            <a:r>
-              <a:rPr lang="da-DK">
-                <a:solidFill>
-                  <a:srgbClr val="000000"/>
-                </a:solidFill>
-                <a:latin typeface="Calibri"/>
-              </a:rPr>
-              <a:t>Fourth level</a:t>
-            </a:r>
-            <a:endParaRPr/>
-          </a:p>
-          <a:p>
-            <a:pPr lvl="4">
-              <a:lnSpc>
-                <a:spcPct val="100000"/>
-              </a:lnSpc>
-              <a:buFont typeface="Arial"/>
-              <a:buChar char="•"/>
-            </a:pPr>
-            <a:r>
-              <a:rPr lang="da-DK">
-                <a:solidFill>
-                  <a:srgbClr val="000000"/>
-                </a:solidFill>
-                <a:latin typeface="Calibri"/>
-              </a:rPr>
-              <a:t>Fifth level</a:t>
-            </a:r>
-            <a:endParaRPr/>
-          </a:p>
-        </p:txBody>
-      </p:sp>
-      <p:sp>
-        <p:nvSpPr>
-          <p:cNvPr id="41" name="PlaceHolder 3"/>
-          <p:cNvSpPr>
-            <a:spLocks noGrp="1"/>
-          </p:cNvSpPr>
-          <p:nvPr>
-            <p:ph type="dt"/>
-          </p:nvPr>
-        </p:nvSpPr>
-        <p:spPr>
-          <a:xfrm>
-            <a:off x="838080" y="6356520"/>
-            <a:ext cx="2742840" cy="364680"/>
-          </a:xfrm>
-          <a:prstGeom prst="rect">
-            <a:avLst/>
-          </a:prstGeom>
-        </p:spPr>
-        <p:txBody>
-          <a:bodyPr anchor="ctr"/>
-          <a:p>
-            <a:pPr>
-              <a:lnSpc>
-                <a:spcPct val="100000"/>
-              </a:lnSpc>
-            </a:pPr>
-            <a:r>
-              <a:rPr lang="en-US" sz="1200">
-                <a:solidFill>
-                  <a:srgbClr val="8b8b8b"/>
-                </a:solidFill>
-                <a:latin typeface="Calibri"/>
-              </a:rPr>
-              <a:t>3/7/19</a:t>
-            </a:r>
-            <a:endParaRPr/>
-          </a:p>
-        </p:txBody>
-      </p:sp>
-      <p:sp>
-        <p:nvSpPr>
-          <p:cNvPr id="42" name="PlaceHolder 4"/>
-          <p:cNvSpPr>
-            <a:spLocks noGrp="1"/>
-          </p:cNvSpPr>
-          <p:nvPr>
-            <p:ph type="ftr"/>
-          </p:nvPr>
-        </p:nvSpPr>
-        <p:spPr>
-          <a:xfrm>
-            <a:off x="4038480" y="6356520"/>
-            <a:ext cx="4114440" cy="364680"/>
-          </a:xfrm>
-          <a:prstGeom prst="rect">
-            <a:avLst/>
-          </a:prstGeom>
-        </p:spPr>
-        <p:txBody>
-          <a:bodyPr anchor="ctr"/>
-          <a:p>
-            <a:endParaRPr/>
-          </a:p>
-        </p:txBody>
-      </p:sp>
-      <p:sp>
-        <p:nvSpPr>
-          <p:cNvPr id="43" name="PlaceHolder 5"/>
-          <p:cNvSpPr>
-            <a:spLocks noGrp="1"/>
-          </p:cNvSpPr>
-          <p:nvPr>
-            <p:ph type="sldNum"/>
-          </p:nvPr>
-        </p:nvSpPr>
-        <p:spPr>
-          <a:xfrm>
-            <a:off x="8610480" y="6356520"/>
-            <a:ext cx="2742840" cy="364680"/>
-          </a:xfrm>
-          <a:prstGeom prst="rect">
-            <a:avLst/>
-          </a:prstGeom>
-        </p:spPr>
-        <p:txBody>
-          <a:bodyPr anchor="ctr"/>
-          <a:p>
-            <a:pPr algn="r">
-              <a:lnSpc>
-                <a:spcPct val="100000"/>
-              </a:lnSpc>
-            </a:pPr>
-            <a:fld id="{0F47130B-B9D9-4378-B860-D6A124CD5091}" type="slidenum">
-              <a:rPr lang="en-US" sz="1200">
-                <a:solidFill>
-                  <a:srgbClr val="8b8b8b"/>
-                </a:solidFill>
-                <a:latin typeface="Calibri"/>
-              </a:rPr>
-              <a:t>&lt;number&gt;</a:t>
-            </a:fld>
             <a:endParaRPr/>
           </a:p>
         </p:txBody>
@@ -4210,113 +3914,7 @@
       </p:grpSpPr>
       <p:sp>
         <p:nvSpPr>
-          <p:cNvPr id="78" name="PlaceHolder 1"/>
-          <p:cNvSpPr>
-            <a:spLocks noGrp="1"/>
-          </p:cNvSpPr>
-          <p:nvPr>
-            <p:ph type="dt"/>
-          </p:nvPr>
-        </p:nvSpPr>
-        <p:spPr>
-          <a:xfrm>
-            <a:off x="838080" y="6356520"/>
-            <a:ext cx="2742840" cy="364680"/>
-          </a:xfrm>
-          <a:prstGeom prst="rect">
-            <a:avLst/>
-          </a:prstGeom>
-        </p:spPr>
-        <p:txBody>
-          <a:bodyPr anchor="ctr"/>
-          <a:p>
-            <a:pPr>
-              <a:lnSpc>
-                <a:spcPct val="100000"/>
-              </a:lnSpc>
-            </a:pPr>
-            <a:r>
-              <a:rPr lang="en-US" sz="1200">
-                <a:solidFill>
-                  <a:srgbClr val="8b8b8b"/>
-                </a:solidFill>
-                <a:latin typeface="Calibri"/>
-              </a:rPr>
-              <a:t>3/7/19</a:t>
-            </a:r>
-            <a:endParaRPr/>
-          </a:p>
-        </p:txBody>
-      </p:sp>
-      <p:sp>
-        <p:nvSpPr>
-          <p:cNvPr id="79" name="PlaceHolder 2"/>
-          <p:cNvSpPr>
-            <a:spLocks noGrp="1"/>
-          </p:cNvSpPr>
-          <p:nvPr>
-            <p:ph type="ftr"/>
-          </p:nvPr>
-        </p:nvSpPr>
-        <p:spPr>
-          <a:xfrm>
-            <a:off x="4038480" y="6356520"/>
-            <a:ext cx="4114440" cy="364680"/>
-          </a:xfrm>
-          <a:prstGeom prst="rect">
-            <a:avLst/>
-          </a:prstGeom>
-        </p:spPr>
-        <p:txBody>
-          <a:bodyPr anchor="ctr"/>
-          <a:p>
-            <a:endParaRPr/>
-          </a:p>
-        </p:txBody>
-      </p:sp>
-      <p:sp>
-        <p:nvSpPr>
-          <p:cNvPr id="80" name="PlaceHolder 3"/>
-          <p:cNvSpPr>
-            <a:spLocks noGrp="1"/>
-          </p:cNvSpPr>
-          <p:nvPr>
-            <p:ph type="sldNum"/>
-          </p:nvPr>
-        </p:nvSpPr>
-        <p:spPr>
-          <a:xfrm>
-            <a:off x="8610480" y="6356520"/>
-            <a:ext cx="2742840" cy="364680"/>
-          </a:xfrm>
-          <a:prstGeom prst="rect">
-            <a:avLst/>
-          </a:prstGeom>
-        </p:spPr>
-        <p:txBody>
-          <a:bodyPr anchor="ctr"/>
-          <a:p>
-            <a:pPr algn="r">
-              <a:lnSpc>
-                <a:spcPct val="100000"/>
-              </a:lnSpc>
-            </a:pPr>
-            <a:fld id="{2080D5A4-7DEF-4C2D-8FF6-3D69BD1CDDA4}" type="slidenum">
-              <a:rPr lang="en-US" sz="1200">
-                <a:solidFill>
-                  <a:srgbClr val="8b8b8b"/>
-                </a:solidFill>
-                <a:latin typeface="Calibri"/>
-              </a:rPr>
-              <a:t>&lt;number&gt;</a:t>
-            </a:fld>
-            <a:endParaRPr/>
-          </a:p>
-        </p:txBody>
-      </p:sp>
-      <p:sp>
-        <p:nvSpPr>
-          <p:cNvPr id="81" name="PlaceHolder 4"/>
+          <p:cNvPr id="72" name="PlaceHolder 1"/>
           <p:cNvSpPr>
             <a:spLocks noGrp="1"/>
           </p:cNvSpPr>
@@ -4336,9 +3934,10 @@
         <p:txBody>
           <a:bodyPr lIns="0" rIns="0" tIns="0" bIns="0" anchor="ctr"/>
           <a:p>
+            <a:pPr algn="ctr"/>
             <a:r>
-              <a:rPr lang="da-DK">
-                <a:latin typeface="Calibri"/>
+              <a:rPr lang="en-US" sz="4400">
+                <a:latin typeface="Arial"/>
               </a:rPr>
               <a:t>Click to edit the title text format</a:t>
             </a:r>
@@ -4348,7 +3947,7 @@
       </p:sp>
       <p:sp>
         <p:nvSpPr>
-          <p:cNvPr id="82" name="PlaceHolder 5"/>
+          <p:cNvPr id="73" name="PlaceHolder 2"/>
           <p:cNvSpPr>
             <a:spLocks noGrp="1"/>
           </p:cNvSpPr>
@@ -4374,8 +3973,8 @@
               <a:buChar char=""/>
             </a:pPr>
             <a:r>
-              <a:rPr lang="da-DK" sz="2800">
-                <a:latin typeface="Calibri"/>
+              <a:rPr lang="en-US" sz="3200">
+                <a:latin typeface="Arial"/>
               </a:rPr>
               <a:t>Click to edit the outline text format</a:t>
             </a:r>
@@ -4388,8 +3987,8 @@
               <a:buChar char=""/>
             </a:pPr>
             <a:r>
-              <a:rPr lang="da-DK" sz="2000">
-                <a:latin typeface="Calibri"/>
+              <a:rPr lang="en-US" sz="2800">
+                <a:latin typeface="Arial"/>
               </a:rPr>
               <a:t>Second Outline Level</a:t>
             </a:r>
@@ -4402,8 +4001,8 @@
               <a:buChar char=""/>
             </a:pPr>
             <a:r>
-              <a:rPr lang="da-DK">
-                <a:latin typeface="Calibri"/>
+              <a:rPr lang="en-US" sz="2400">
+                <a:latin typeface="Arial"/>
               </a:rPr>
               <a:t>Third Outline Level</a:t>
             </a:r>
@@ -4416,8 +4015,8 @@
               <a:buChar char=""/>
             </a:pPr>
             <a:r>
-              <a:rPr lang="da-DK">
-                <a:latin typeface="Calibri"/>
+              <a:rPr lang="en-US" sz="2000">
+                <a:latin typeface="Arial"/>
               </a:rPr>
               <a:t>Fourth Outline Level</a:t>
             </a:r>
@@ -4430,8 +4029,8 @@
               <a:buChar char=""/>
             </a:pPr>
             <a:r>
-              <a:rPr lang="da-DK" sz="2000">
-                <a:latin typeface="Calibri"/>
+              <a:rPr lang="en-US" sz="2000">
+                <a:latin typeface="Arial"/>
               </a:rPr>
               <a:t>Fifth Outline Level</a:t>
             </a:r>
@@ -4444,8 +4043,8 @@
               <a:buChar char=""/>
             </a:pPr>
             <a:r>
-              <a:rPr lang="da-DK" sz="2000">
-                <a:latin typeface="Calibri"/>
+              <a:rPr lang="en-US" sz="2000">
+                <a:latin typeface="Arial"/>
               </a:rPr>
               <a:t>Sixth Outline Level</a:t>
             </a:r>
@@ -4458,8 +4057,8 @@
               <a:buChar char=""/>
             </a:pPr>
             <a:r>
-              <a:rPr lang="da-DK" sz="2000">
-                <a:latin typeface="Calibri"/>
+              <a:rPr lang="en-US" sz="2000">
+                <a:latin typeface="Arial"/>
               </a:rPr>
               <a:t>Seventh Outline Level</a:t>
             </a:r>
@@ -4506,21 +4105,25 @@
       </p:grpSpPr>
       <p:sp>
         <p:nvSpPr>
-          <p:cNvPr id="117" name="TextShape 1"/>
-          <p:cNvSpPr txBox="1"/>
+          <p:cNvPr id="108" name="CustomShape 1"/>
+          <p:cNvSpPr/>
           <p:nvPr/>
         </p:nvSpPr>
         <p:spPr>
           <a:xfrm>
             <a:off x="1523880" y="1122480"/>
-            <a:ext cx="9143640" cy="2387160"/>
-          </a:xfrm>
-          <a:prstGeom prst="rect">
-            <a:avLst/>
-          </a:prstGeom>
-        </p:spPr>
-        <p:txBody>
-          <a:bodyPr anchor="b"/>
+            <a:ext cx="9143280" cy="2386800"/>
+          </a:xfrm>
+          <a:prstGeom prst="rect">
+            <a:avLst/>
+          </a:prstGeom>
+          <a:noFill/>
+          <a:ln>
+            <a:noFill/>
+          </a:ln>
+        </p:spPr>
+        <p:txBody>
+          <a:bodyPr lIns="90000" rIns="90000" tIns="45000" bIns="45000" anchor="b"/>
           <a:p>
             <a:pPr algn="ctr">
               <a:lnSpc>
@@ -4528,7 +4131,7 @@
               </a:lnSpc>
             </a:pPr>
             <a:r>
-              <a:rPr lang="da-DK" sz="6000">
+              <a:rPr lang="en-US" sz="6000">
                 <a:solidFill>
                   <a:srgbClr val="000000"/>
                 </a:solidFill>
@@ -4542,21 +4145,25 @@
       </p:sp>
       <p:sp>
         <p:nvSpPr>
-          <p:cNvPr id="118" name="TextShape 2"/>
-          <p:cNvSpPr txBox="1"/>
+          <p:cNvPr id="109" name="CustomShape 2"/>
+          <p:cNvSpPr/>
           <p:nvPr/>
         </p:nvSpPr>
         <p:spPr>
           <a:xfrm>
             <a:off x="1523880" y="3602160"/>
-            <a:ext cx="9143640" cy="1655280"/>
-          </a:xfrm>
-          <a:prstGeom prst="rect">
-            <a:avLst/>
-          </a:prstGeom>
-        </p:spPr>
-        <p:txBody>
-          <a:bodyPr/>
+            <a:ext cx="9143280" cy="1654920"/>
+          </a:xfrm>
+          <a:prstGeom prst="rect">
+            <a:avLst/>
+          </a:prstGeom>
+          <a:noFill/>
+          <a:ln>
+            <a:noFill/>
+          </a:ln>
+        </p:spPr>
+        <p:txBody>
+          <a:bodyPr lIns="90000" rIns="90000" tIns="45000" bIns="45000"/>
           <a:p>
             <a:pPr algn="ctr">
               <a:lnSpc>
@@ -4627,21 +4234,25 @@
       </p:grpSpPr>
       <p:sp>
         <p:nvSpPr>
-          <p:cNvPr id="119" name="TextShape 1"/>
-          <p:cNvSpPr txBox="1"/>
+          <p:cNvPr id="110" name="CustomShape 1"/>
+          <p:cNvSpPr/>
           <p:nvPr/>
         </p:nvSpPr>
         <p:spPr>
           <a:xfrm>
             <a:off x="838080" y="365040"/>
-            <a:ext cx="10515240" cy="1325160"/>
-          </a:xfrm>
-          <a:prstGeom prst="rect">
-            <a:avLst/>
-          </a:prstGeom>
-        </p:spPr>
-        <p:txBody>
-          <a:bodyPr anchor="ctr"/>
+            <a:ext cx="10514880" cy="1324800"/>
+          </a:xfrm>
+          <a:prstGeom prst="rect">
+            <a:avLst/>
+          </a:prstGeom>
+          <a:noFill/>
+          <a:ln>
+            <a:noFill/>
+          </a:ln>
+        </p:spPr>
+        <p:txBody>
+          <a:bodyPr lIns="90000" rIns="90000" tIns="45000" bIns="45000" anchor="ctr"/>
           <a:p>
             <a:pPr>
               <a:lnSpc>
@@ -4649,7 +4260,7 @@
               </a:lnSpc>
             </a:pPr>
             <a:r>
-              <a:rPr lang="da-DK" sz="4400">
+              <a:rPr lang="en-US" sz="4400">
                 <a:solidFill>
                   <a:srgbClr val="000000"/>
                 </a:solidFill>
@@ -4658,7 +4269,7 @@
               <a:t>Information</a:t>
             </a:r>
             <a:r>
-              <a:rPr lang="da-DK" sz="4400">
+              <a:rPr lang="en-US" sz="4400">
                 <a:solidFill>
                   <a:srgbClr val="000000"/>
                 </a:solidFill>
@@ -4672,21 +4283,25 @@
       </p:sp>
       <p:sp>
         <p:nvSpPr>
-          <p:cNvPr id="120" name="TextShape 2"/>
-          <p:cNvSpPr txBox="1"/>
+          <p:cNvPr id="111" name="CustomShape 2"/>
+          <p:cNvSpPr/>
           <p:nvPr/>
         </p:nvSpPr>
         <p:spPr>
           <a:xfrm>
             <a:off x="838080" y="1825560"/>
-            <a:ext cx="10515240" cy="4350960"/>
-          </a:xfrm>
-          <a:prstGeom prst="rect">
-            <a:avLst/>
-          </a:prstGeom>
-        </p:spPr>
-        <p:txBody>
-          <a:bodyPr/>
+            <a:ext cx="10514880" cy="4350600"/>
+          </a:xfrm>
+          <a:prstGeom prst="rect">
+            <a:avLst/>
+          </a:prstGeom>
+          <a:noFill/>
+          <a:ln>
+            <a:noFill/>
+          </a:ln>
+        </p:spPr>
+        <p:txBody>
+          <a:bodyPr lIns="90000" rIns="90000" tIns="45000" bIns="45000"/>
           <a:p>
             <a:pPr>
               <a:lnSpc>
@@ -4696,7 +4311,7 @@
               <a:buChar char="•"/>
             </a:pPr>
             <a:r>
-              <a:rPr lang="da-DK" sz="2800">
+              <a:rPr lang="en-US" sz="2800">
                 <a:solidFill>
                   <a:srgbClr val="000000"/>
                 </a:solidFill>
@@ -4715,7 +4330,7 @@
               <a:buChar char="•"/>
             </a:pPr>
             <a:r>
-              <a:rPr lang="da-DK" sz="2800">
+              <a:rPr lang="en-US" sz="2800">
                 <a:solidFill>
                   <a:srgbClr val="000000"/>
                 </a:solidFill>
@@ -4734,7 +4349,7 @@
               <a:buChar char="•"/>
             </a:pPr>
             <a:r>
-              <a:rPr lang="da-DK" sz="2800">
+              <a:rPr lang="en-US" sz="2800">
                 <a:solidFill>
                   <a:srgbClr val="000000"/>
                 </a:solidFill>
@@ -4753,7 +4368,7 @@
               <a:buChar char="•"/>
             </a:pPr>
             <a:r>
-              <a:rPr lang="da-DK" sz="2800">
+              <a:rPr lang="en-US" sz="2800">
                 <a:solidFill>
                   <a:srgbClr val="000000"/>
                 </a:solidFill>
@@ -4772,7 +4387,7 @@
               <a:buChar char="•"/>
             </a:pPr>
             <a:r>
-              <a:rPr lang="da-DK" sz="2800">
+              <a:rPr lang="en-US" sz="2800">
                 <a:solidFill>
                   <a:srgbClr val="000000"/>
                 </a:solidFill>
@@ -4791,7 +4406,7 @@
               <a:buChar char="•"/>
             </a:pPr>
             <a:r>
-              <a:rPr lang="da-DK" sz="2800">
+              <a:rPr lang="en-US" sz="2800">
                 <a:solidFill>
                   <a:srgbClr val="000000"/>
                 </a:solidFill>
@@ -4854,7 +4469,7 @@
       </p:grpSpPr>
       <p:pic>
         <p:nvPicPr>
-          <p:cNvPr id="121" name="Picture 3" descr=""/>
+          <p:cNvPr id="112" name="Picture 3" descr=""/>
           <p:cNvPicPr/>
           <p:nvPr/>
         </p:nvPicPr>
@@ -4867,7 +4482,7 @@
         <p:spPr>
           <a:xfrm>
             <a:off x="0" y="0"/>
-            <a:ext cx="12161520" cy="6858000"/>
+            <a:ext cx="12161160" cy="6857640"/>
           </a:xfrm>
           <a:prstGeom prst="rect">
             <a:avLst/>
@@ -4879,14 +4494,14 @@
       </p:pic>
       <p:sp>
         <p:nvSpPr>
-          <p:cNvPr id="122" name="CustomShape 1"/>
+          <p:cNvPr id="113" name="CustomShape 1"/>
           <p:cNvSpPr/>
           <p:nvPr/>
         </p:nvSpPr>
         <p:spPr>
           <a:xfrm>
             <a:off x="3765600" y="753120"/>
-            <a:ext cx="5248440" cy="364680"/>
+            <a:ext cx="5248080" cy="364320"/>
           </a:xfrm>
           <a:prstGeom prst="rect">
             <a:avLst/>
@@ -4968,7 +4583,7 @@
       </p:grpSpPr>
       <p:pic>
         <p:nvPicPr>
-          <p:cNvPr id="123" name="Picture 1" descr=""/>
+          <p:cNvPr id="114" name="Picture 1" descr=""/>
           <p:cNvPicPr/>
           <p:nvPr/>
         </p:nvPicPr>
@@ -4981,7 +4596,7 @@
         <p:spPr>
           <a:xfrm>
             <a:off x="0" y="0"/>
-            <a:ext cx="12559320" cy="7064280"/>
+            <a:ext cx="12558960" cy="7063920"/>
           </a:xfrm>
           <a:prstGeom prst="rect">
             <a:avLst/>
@@ -4993,14 +4608,14 @@
       </p:pic>
       <p:sp>
         <p:nvSpPr>
-          <p:cNvPr id="124" name="CustomShape 1"/>
+          <p:cNvPr id="115" name="CustomShape 1"/>
           <p:cNvSpPr/>
           <p:nvPr/>
         </p:nvSpPr>
         <p:spPr>
           <a:xfrm>
             <a:off x="3310200" y="518760"/>
-            <a:ext cx="4117680" cy="639000"/>
+            <a:ext cx="4117320" cy="638640"/>
           </a:xfrm>
           <a:prstGeom prst="rect">
             <a:avLst/>
@@ -5099,12 +4714,13 @@
       </p:grpSpPr>
       <p:pic>
         <p:nvPicPr>
-          <p:cNvPr id="125" name="Picture 1" descr=""/>
+          <p:cNvPr id="116" name="Picture 1" descr=""/>
           <p:cNvPicPr/>
           <p:nvPr/>
         </p:nvPicPr>
         <p:blipFill>
           <a:blip r:embed="rId1"/>
+          <a:srcRect l="0" t="0" r="-1024722" b="1116481"/>
           <a:stretch>
             <a:fillRect/>
           </a:stretch>
@@ -5112,7 +4728,7 @@
         <p:spPr>
           <a:xfrm>
             <a:off x="0" y="0"/>
-            <a:ext cx="12657960" cy="7119720"/>
+            <a:ext cx="12192120" cy="6858000"/>
           </a:xfrm>
           <a:prstGeom prst="rect">
             <a:avLst/>
@@ -5173,7 +4789,7 @@
       </p:grpSpPr>
       <p:pic>
         <p:nvPicPr>
-          <p:cNvPr id="126" name="Picture 1" descr=""/>
+          <p:cNvPr id="117" name="Picture 1" descr=""/>
           <p:cNvPicPr/>
           <p:nvPr/>
         </p:nvPicPr>
@@ -5186,7 +4802,7 @@
         <p:spPr>
           <a:xfrm>
             <a:off x="0" y="0"/>
-            <a:ext cx="12191760" cy="6857640"/>
+            <a:ext cx="12191400" cy="6857280"/>
           </a:xfrm>
           <a:prstGeom prst="rect">
             <a:avLst/>

</xml_diff>